<commit_message>
update report for 211008 AI
</commit_message>
<xml_diff>
--- a/report/211008_AI.pptx
+++ b/report/211008_AI.pptx
@@ -5,21 +5,20 @@
     <p:sldMasterId id="2147483648" r:id="rId1"/>
   </p:sldMasterIdLst>
   <p:notesMasterIdLst>
-    <p:notesMasterId r:id="rId11"/>
+    <p:notesMasterId r:id="rId10"/>
   </p:notesMasterIdLst>
   <p:handoutMasterIdLst>
-    <p:handoutMasterId r:id="rId12"/>
+    <p:handoutMasterId r:id="rId11"/>
   </p:handoutMasterIdLst>
   <p:sldIdLst>
     <p:sldId id="256" r:id="rId2"/>
     <p:sldId id="266" r:id="rId3"/>
-    <p:sldId id="500" r:id="rId4"/>
-    <p:sldId id="502" r:id="rId5"/>
-    <p:sldId id="508" r:id="rId6"/>
-    <p:sldId id="510" r:id="rId7"/>
-    <p:sldId id="511" r:id="rId8"/>
-    <p:sldId id="509" r:id="rId9"/>
-    <p:sldId id="339" r:id="rId10"/>
+    <p:sldId id="502" r:id="rId4"/>
+    <p:sldId id="508" r:id="rId5"/>
+    <p:sldId id="510" r:id="rId6"/>
+    <p:sldId id="511" r:id="rId7"/>
+    <p:sldId id="509" r:id="rId8"/>
+    <p:sldId id="339" r:id="rId9"/>
   </p:sldIdLst>
   <p:sldSz cx="13004800" cy="9753600"/>
   <p:notesSz cx="6797675" cy="9929813"/>
@@ -411,7 +410,7 @@
           <a:p>
             <a:fld id="{654D9611-E584-4159-9E45-463C4283EFF5}" type="datetimeFigureOut">
               <a:rPr lang="ko-KR" altLang="en-US" smtClean="0"/>
-              <a:t>2021-10-05</a:t>
+              <a:t>2021-10-08</a:t>
             </a:fld>
             <a:endParaRPr lang="ko-KR" altLang="en-US"/>
           </a:p>
@@ -3578,7 +3577,6 @@
               <a:rPr lang="en-US" dirty="0" smtClean="0"/>
               <a:t>21.10.08</a:t>
             </a:r>
-            <a:endParaRPr lang="en-US" dirty="0" smtClean="0"/>
           </a:p>
           <a:p>
             <a:endParaRPr dirty="0"/>
@@ -3690,17 +3688,6 @@
         <p:txBody>
           <a:bodyPr/>
           <a:lstStyle/>
-          <a:p>
-            <a:pPr latinLnBrk="1"/>
-            <a:r>
-              <a:rPr lang="en-US" altLang="ko-KR" dirty="0" err="1" smtClean="0"/>
-              <a:t>Kaggle</a:t>
-            </a:r>
-            <a:r>
-              <a:rPr lang="en-US" altLang="ko-KR" dirty="0" smtClean="0"/>
-              <a:t> Competition</a:t>
-            </a:r>
-          </a:p>
           <a:p>
             <a:pPr latinLnBrk="1"/>
             <a:r>
@@ -3779,14 +3766,9 @@
           <a:p>
             <a:pPr latinLnBrk="1"/>
             <a:r>
-              <a:rPr lang="en-US" altLang="ko-KR" dirty="0" err="1" smtClean="0"/>
-              <a:t>Kaggle</a:t>
-            </a:r>
-            <a:r>
-              <a:rPr lang="en-US" altLang="ko-KR" dirty="0" smtClean="0"/>
-              <a:t> Competition</a:t>
-            </a:r>
-            <a:endParaRPr lang="ko-KR" altLang="ko-KR" dirty="0"/>
+              <a:rPr lang="en-US" altLang="ko-KR" dirty="0"/>
+              <a:t>SOTA method for Paper Revision : Explainable CNN</a:t>
+            </a:r>
           </a:p>
         </p:txBody>
       </p:sp>
@@ -3803,7 +3785,7 @@
         <p:spPr>
           <a:xfrm>
             <a:off x="463550" y="2533973"/>
-            <a:ext cx="11835130" cy="1619573"/>
+            <a:ext cx="11763619" cy="2391988"/>
           </a:xfrm>
           <a:prstGeom prst="rect">
             <a:avLst/>
@@ -3824,26 +3806,11 @@
               </a:defRPr>
             </a:pPr>
             <a:r>
-              <a:rPr lang="en-US" altLang="ko-KR" dirty="0">
-                <a:solidFill>
-                  <a:schemeClr val="tx1"/>
-                </a:solidFill>
+              <a:rPr lang="en-US" altLang="ko-KR" dirty="0" smtClean="0">
+                <a:sym typeface="Helvetica"/>
               </a:rPr>
-              <a:t>1</a:t>
-            </a:r>
-            <a:r>
-              <a:rPr lang="en-US" altLang="ko-KR" dirty="0" smtClean="0">
-                <a:solidFill>
-                  <a:schemeClr val="tx1"/>
-                </a:solidFill>
-              </a:rPr>
-              <a:t>. Tabular Playground Series – Jun 2021</a:t>
-            </a:r>
-            <a:endParaRPr lang="en-US" altLang="ko-KR" b="1" dirty="0" smtClean="0">
-              <a:solidFill>
-                <a:schemeClr val="tx1"/>
-              </a:solidFill>
-            </a:endParaRPr>
+              <a:t>Explainable CNN</a:t>
+            </a:r>
           </a:p>
           <a:p>
             <a:pPr lvl="1">
@@ -3855,27 +3822,46 @@
               </a:defRPr>
             </a:pPr>
             <a:r>
+              <a:rPr lang="en-US" altLang="ko-KR" dirty="0" smtClean="0">
+                <a:solidFill>
+                  <a:srgbClr val="0000FF"/>
+                </a:solidFill>
+                <a:sym typeface="Helvetica"/>
+              </a:rPr>
+              <a:t>German Traffic Sign Recognition Benchmark </a:t>
+            </a:r>
+            <a:r>
+              <a:rPr lang="en-US" altLang="ko-KR" dirty="0" smtClean="0">
+                <a:sym typeface="Helvetica"/>
+              </a:rPr>
+              <a:t>dataset</a:t>
+            </a:r>
+          </a:p>
+          <a:p>
+            <a:pPr lvl="2">
+              <a:defRPr>
+                <a:latin typeface="Helvetica"/>
+                <a:ea typeface="Helvetica"/>
+                <a:cs typeface="Helvetica"/>
+                <a:sym typeface="Helvetica"/>
+              </a:defRPr>
+            </a:pPr>
+            <a:r>
               <a:rPr lang="en-US" altLang="ko-KR" dirty="0">
-                <a:solidFill>
-                  <a:schemeClr val="tx1"/>
-                </a:solidFill>
+                <a:sym typeface="Helvetica"/>
                 <a:hlinkClick r:id="rId2"/>
               </a:rPr>
               <a:t>https://</a:t>
             </a:r>
             <a:r>
               <a:rPr lang="en-US" altLang="ko-KR" dirty="0" smtClean="0">
-                <a:solidFill>
-                  <a:schemeClr val="tx1"/>
-                </a:solidFill>
+                <a:sym typeface="Helvetica"/>
                 <a:hlinkClick r:id="rId2"/>
               </a:rPr>
-              <a:t>www.kaggle.com/c/tabular-playground-series-jun-2021</a:t>
+              <a:t>www.kaggle.com/meowmeowmeowmeowmeow/gtsrb-german-traffic-sign</a:t>
             </a:r>
             <a:endParaRPr lang="en-US" altLang="ko-KR" dirty="0" smtClean="0">
-              <a:solidFill>
-                <a:schemeClr val="tx1"/>
-              </a:solidFill>
+              <a:sym typeface="Helvetica"/>
             </a:endParaRPr>
           </a:p>
         </p:txBody>
@@ -3913,7 +3899,7 @@
       </p:sp>
       <p:pic>
         <p:nvPicPr>
-          <p:cNvPr id="3" name="그림 2"/>
+          <p:cNvPr id="5" name="그림 4"/>
           <p:cNvPicPr>
             <a:picLocks noChangeAspect="1"/>
           </p:cNvPicPr>
@@ -3927,8 +3913,8 @@
         </p:blipFill>
         <p:spPr>
           <a:xfrm>
-            <a:off x="584835" y="4286281"/>
-            <a:ext cx="11835130" cy="3321710"/>
+            <a:off x="939800" y="4925961"/>
+            <a:ext cx="11125200" cy="3286125"/>
           </a:xfrm>
           <a:prstGeom prst="rect">
             <a:avLst/>
@@ -3938,7 +3924,7 @@
     </p:spTree>
     <p:extLst>
       <p:ext uri="{BB962C8B-B14F-4D97-AF65-F5344CB8AC3E}">
-        <p14:creationId xmlns:p14="http://schemas.microsoft.com/office/powerpoint/2010/main" val="1677258574"/>
+        <p14:creationId xmlns:p14="http://schemas.microsoft.com/office/powerpoint/2010/main" val="4238301559"/>
       </p:ext>
     </p:extLst>
   </p:cSld>
@@ -4019,7 +4005,7 @@
         <p:spPr>
           <a:xfrm>
             <a:off x="463550" y="2533973"/>
-            <a:ext cx="11763619" cy="2391988"/>
+            <a:ext cx="12077700" cy="3321137"/>
           </a:xfrm>
           <a:prstGeom prst="rect">
             <a:avLst/>
@@ -4068,7 +4054,7 @@
               <a:rPr lang="en-US" altLang="ko-KR" dirty="0" smtClean="0">
                 <a:sym typeface="Helvetica"/>
               </a:rPr>
-              <a:t>dataset</a:t>
+              <a:t>dataset (3)</a:t>
             </a:r>
           </a:p>
           <a:p>
@@ -4081,20 +4067,112 @@
               </a:defRPr>
             </a:pPr>
             <a:r>
-              <a:rPr lang="en-US" altLang="ko-KR" dirty="0">
-                <a:sym typeface="Helvetica"/>
-                <a:hlinkClick r:id="rId2"/>
+              <a:rPr lang="en-US" altLang="ko-KR" dirty="0" smtClean="0">
+                <a:sym typeface="Helvetica"/>
               </a:rPr>
-              <a:t>https://</a:t>
-            </a:r>
+              <a:t>Car vs. Non-car dataset</a:t>
+            </a:r>
+            <a:r>
+              <a:rPr lang="ko-KR" altLang="en-US" dirty="0" smtClean="0">
+                <a:sym typeface="Helvetica"/>
+              </a:rPr>
+              <a:t>과 마찬가지로 </a:t>
+            </a:r>
+            <a:r>
+              <a:rPr lang="en-US" altLang="ko-KR" b="1" dirty="0" smtClean="0">
+                <a:solidFill>
+                  <a:srgbClr val="0000FF"/>
+                </a:solidFill>
+                <a:sym typeface="Helvetica"/>
+              </a:rPr>
+              <a:t>XAI</a:t>
+            </a:r>
+            <a:r>
+              <a:rPr lang="ko-KR" altLang="en-US" b="1" dirty="0" smtClean="0">
+                <a:solidFill>
+                  <a:srgbClr val="0000FF"/>
+                </a:solidFill>
+                <a:sym typeface="Helvetica"/>
+              </a:rPr>
+              <a:t>를 이용하여 설명을 도출하기 위한 알고리즘</a:t>
+            </a:r>
+            <a:r>
+              <a:rPr lang="ko-KR" altLang="en-US" dirty="0" smtClean="0">
+                <a:sym typeface="Helvetica"/>
+              </a:rPr>
+              <a:t> 설계</a:t>
+            </a:r>
+            <a:endParaRPr lang="en-US" altLang="ko-KR" dirty="0" smtClean="0">
+              <a:sym typeface="Helvetica"/>
+            </a:endParaRPr>
+          </a:p>
+          <a:p>
+            <a:pPr lvl="1">
+              <a:defRPr>
+                <a:latin typeface="Helvetica"/>
+                <a:ea typeface="Helvetica"/>
+                <a:cs typeface="Helvetica"/>
+                <a:sym typeface="Helvetica"/>
+              </a:defRPr>
+            </a:pPr>
             <a:r>
               <a:rPr lang="en-US" altLang="ko-KR" dirty="0" smtClean="0">
-                <a:sym typeface="Helvetica"/>
-                <a:hlinkClick r:id="rId2"/>
+                <a:solidFill>
+                  <a:schemeClr val="tx1"/>
+                </a:solidFill>
+                <a:sym typeface="Helvetica"/>
               </a:rPr>
-              <a:t>www.kaggle.com/meowmeowmeowmeowmeow/gtsrb-german-traffic-sign</a:t>
-            </a:r>
-            <a:endParaRPr lang="en-US" altLang="ko-KR" dirty="0" smtClean="0">
+              <a:t>German Traffic Sign Recognition Benchmark</a:t>
+            </a:r>
+            <a:r>
+              <a:rPr lang="ko-KR" altLang="en-US" dirty="0" smtClean="0">
+                <a:solidFill>
+                  <a:schemeClr val="tx1"/>
+                </a:solidFill>
+                <a:sym typeface="Helvetica"/>
+              </a:rPr>
+              <a:t>에서 </a:t>
+            </a:r>
+            <a:r>
+              <a:rPr lang="ko-KR" altLang="en-US" dirty="0" smtClean="0">
+                <a:solidFill>
+                  <a:srgbClr val="0000FF"/>
+                </a:solidFill>
+                <a:sym typeface="Helvetica"/>
+              </a:rPr>
+              <a:t>속도 제한 </a:t>
+            </a:r>
+            <a:r>
+              <a:rPr lang="ko-KR" altLang="en-US" dirty="0" err="1" smtClean="0">
+                <a:solidFill>
+                  <a:srgbClr val="0000FF"/>
+                </a:solidFill>
+                <a:sym typeface="Helvetica"/>
+              </a:rPr>
+              <a:t>표지판</a:t>
+            </a:r>
+            <a:r>
+              <a:rPr lang="ko-KR" altLang="en-US" dirty="0" err="1" smtClean="0">
+                <a:solidFill>
+                  <a:schemeClr val="tx1"/>
+                </a:solidFill>
+                <a:sym typeface="Helvetica"/>
+              </a:rPr>
+              <a:t>만을</a:t>
+            </a:r>
+            <a:r>
+              <a:rPr lang="ko-KR" altLang="en-US" dirty="0" smtClean="0">
+                <a:solidFill>
+                  <a:schemeClr val="tx1"/>
+                </a:solidFill>
+                <a:sym typeface="Helvetica"/>
+              </a:rPr>
+              <a:t> 이용</a:t>
+            </a:r>
+            <a:endParaRPr lang="en-US" altLang="ko-KR" b="1" dirty="0" smtClean="0">
+              <a:solidFill>
+                <a:srgbClr val="0000FF"/>
+              </a:solidFill>
               <a:sym typeface="Helvetica"/>
             </a:endParaRPr>
           </a:p>
@@ -4126,336 +4204,6 @@
           <a:p>
             <a:fld id="{86CB4B4D-7CA3-9044-876B-883B54F8677D}" type="slidenum">
               <a:t>4</a:t>
-            </a:fld>
-            <a:endParaRPr/>
-          </a:p>
-        </p:txBody>
-      </p:sp>
-      <p:pic>
-        <p:nvPicPr>
-          <p:cNvPr id="5" name="그림 4"/>
-          <p:cNvPicPr>
-            <a:picLocks noChangeAspect="1"/>
-          </p:cNvPicPr>
-          <p:nvPr/>
-        </p:nvPicPr>
-        <p:blipFill>
-          <a:blip r:embed="rId3"/>
-          <a:stretch>
-            <a:fillRect/>
-          </a:stretch>
-        </p:blipFill>
-        <p:spPr>
-          <a:xfrm>
-            <a:off x="939800" y="4925961"/>
-            <a:ext cx="11125200" cy="3286125"/>
-          </a:xfrm>
-          <a:prstGeom prst="rect">
-            <a:avLst/>
-          </a:prstGeom>
-        </p:spPr>
-      </p:pic>
-    </p:spTree>
-    <p:extLst>
-      <p:ext uri="{BB962C8B-B14F-4D97-AF65-F5344CB8AC3E}">
-        <p14:creationId xmlns:p14="http://schemas.microsoft.com/office/powerpoint/2010/main" val="4238301559"/>
-      </p:ext>
-    </p:extLst>
-  </p:cSld>
-  <p:clrMapOvr>
-    <a:masterClrMapping/>
-  </p:clrMapOvr>
-  <p:transition spd="med"/>
-  <p:timing>
-    <p:tnLst>
-      <p:par>
-        <p:cTn id="1" dur="indefinite" restart="never" nodeType="tmRoot"/>
-      </p:par>
-    </p:tnLst>
-  </p:timing>
-</p:sld>
-</file>
-
-<file path=ppt/slides/slide5.xml><?xml version="1.0" encoding="utf-8"?>
-<p:sld xmlns:a="http://schemas.openxmlformats.org/drawingml/2006/main" xmlns:r="http://schemas.openxmlformats.org/officeDocument/2006/relationships" xmlns:p="http://schemas.openxmlformats.org/presentationml/2006/main">
-  <p:cSld>
-    <p:spTree>
-      <p:nvGrpSpPr>
-        <p:cNvPr id="1" name=""/>
-        <p:cNvGrpSpPr/>
-        <p:nvPr/>
-      </p:nvGrpSpPr>
-      <p:grpSpPr>
-        <a:xfrm>
-          <a:off x="0" y="0"/>
-          <a:ext cx="0" cy="0"/>
-          <a:chOff x="0" y="0"/>
-          <a:chExt cx="0" cy="0"/>
-        </a:xfrm>
-      </p:grpSpPr>
-      <p:sp>
-        <p:nvSpPr>
-          <p:cNvPr id="99" name="Current Status"/>
-          <p:cNvSpPr txBox="1">
-            <a:spLocks noGrp="1"/>
-          </p:cNvSpPr>
-          <p:nvPr>
-            <p:ph type="title"/>
-          </p:nvPr>
-        </p:nvSpPr>
-        <p:spPr>
-          <a:xfrm>
-            <a:off x="463550" y="254000"/>
-            <a:ext cx="12077700" cy="1798320"/>
-          </a:xfrm>
-          <a:prstGeom prst="rect">
-            <a:avLst/>
-          </a:prstGeom>
-        </p:spPr>
-        <p:txBody>
-          <a:bodyPr>
-            <a:normAutofit/>
-          </a:bodyPr>
-          <a:lstStyle/>
-          <a:p>
-            <a:pPr latinLnBrk="1"/>
-            <a:r>
-              <a:rPr lang="en-US" altLang="ko-KR" dirty="0"/>
-              <a:t>SOTA method for Paper Revision : Explainable CNN</a:t>
-            </a:r>
-          </a:p>
-        </p:txBody>
-      </p:sp>
-      <p:sp>
-        <p:nvSpPr>
-          <p:cNvPr id="100" name="주간 진행 사항…"/>
-          <p:cNvSpPr txBox="1">
-            <a:spLocks noGrp="1"/>
-          </p:cNvSpPr>
-          <p:nvPr>
-            <p:ph type="body" idx="1"/>
-          </p:nvPr>
-        </p:nvSpPr>
-        <p:spPr>
-          <a:xfrm>
-            <a:off x="463550" y="2533973"/>
-            <a:ext cx="12077700" cy="3321137"/>
-          </a:xfrm>
-          <a:prstGeom prst="rect">
-            <a:avLst/>
-          </a:prstGeom>
-        </p:spPr>
-        <p:txBody>
-          <a:bodyPr>
-            <a:normAutofit/>
-          </a:bodyPr>
-          <a:lstStyle/>
-          <a:p>
-            <a:pPr>
-              <a:defRPr>
-                <a:latin typeface="Helvetica"/>
-                <a:ea typeface="Helvetica"/>
-                <a:cs typeface="Helvetica"/>
-                <a:sym typeface="Helvetica"/>
-              </a:defRPr>
-            </a:pPr>
-            <a:r>
-              <a:rPr lang="en-US" altLang="ko-KR" dirty="0" smtClean="0">
-                <a:sym typeface="Helvetica"/>
-              </a:rPr>
-              <a:t>Explainable CNN</a:t>
-            </a:r>
-          </a:p>
-          <a:p>
-            <a:pPr lvl="1">
-              <a:defRPr>
-                <a:latin typeface="Helvetica"/>
-                <a:ea typeface="Helvetica"/>
-                <a:cs typeface="Helvetica"/>
-                <a:sym typeface="Helvetica"/>
-              </a:defRPr>
-            </a:pPr>
-            <a:r>
-              <a:rPr lang="en-US" altLang="ko-KR" dirty="0" smtClean="0">
-                <a:solidFill>
-                  <a:srgbClr val="0000FF"/>
-                </a:solidFill>
-                <a:sym typeface="Helvetica"/>
-              </a:rPr>
-              <a:t>German Traffic Sign Recognition Benchmark </a:t>
-            </a:r>
-            <a:r>
-              <a:rPr lang="en-US" altLang="ko-KR" dirty="0" smtClean="0">
-                <a:sym typeface="Helvetica"/>
-              </a:rPr>
-              <a:t>dataset </a:t>
-            </a:r>
-            <a:r>
-              <a:rPr lang="en-US" altLang="ko-KR" dirty="0" smtClean="0">
-                <a:sym typeface="Helvetica"/>
-              </a:rPr>
-              <a:t>(3)</a:t>
-            </a:r>
-            <a:endParaRPr lang="en-US" altLang="ko-KR" dirty="0" smtClean="0">
-              <a:sym typeface="Helvetica"/>
-            </a:endParaRPr>
-          </a:p>
-          <a:p>
-            <a:pPr lvl="2">
-              <a:defRPr>
-                <a:latin typeface="Helvetica"/>
-                <a:ea typeface="Helvetica"/>
-                <a:cs typeface="Helvetica"/>
-                <a:sym typeface="Helvetica"/>
-              </a:defRPr>
-            </a:pPr>
-            <a:r>
-              <a:rPr lang="en-US" altLang="ko-KR" dirty="0" smtClean="0">
-                <a:sym typeface="Helvetica"/>
-              </a:rPr>
-              <a:t>Car vs. Non-car dataset</a:t>
-            </a:r>
-            <a:r>
-              <a:rPr lang="ko-KR" altLang="en-US" dirty="0" smtClean="0">
-                <a:sym typeface="Helvetica"/>
-              </a:rPr>
-              <a:t>과 마찬가지로 </a:t>
-            </a:r>
-            <a:r>
-              <a:rPr lang="en-US" altLang="ko-KR" b="1" dirty="0" smtClean="0">
-                <a:solidFill>
-                  <a:srgbClr val="0000FF"/>
-                </a:solidFill>
-                <a:sym typeface="Helvetica"/>
-              </a:rPr>
-              <a:t>XAI</a:t>
-            </a:r>
-            <a:r>
-              <a:rPr lang="ko-KR" altLang="en-US" b="1" dirty="0" smtClean="0">
-                <a:solidFill>
-                  <a:srgbClr val="0000FF"/>
-                </a:solidFill>
-                <a:sym typeface="Helvetica"/>
-              </a:rPr>
-              <a:t>를 이용하여 설명을 도출하기 위한 알고리즘</a:t>
-            </a:r>
-            <a:r>
-              <a:rPr lang="ko-KR" altLang="en-US" dirty="0" smtClean="0">
-                <a:sym typeface="Helvetica"/>
-              </a:rPr>
-              <a:t> 설계</a:t>
-            </a:r>
-            <a:endParaRPr lang="en-US" altLang="ko-KR" dirty="0" smtClean="0">
-              <a:sym typeface="Helvetica"/>
-            </a:endParaRPr>
-          </a:p>
-          <a:p>
-            <a:pPr lvl="1">
-              <a:defRPr>
-                <a:latin typeface="Helvetica"/>
-                <a:ea typeface="Helvetica"/>
-                <a:cs typeface="Helvetica"/>
-                <a:sym typeface="Helvetica"/>
-              </a:defRPr>
-            </a:pPr>
-            <a:r>
-              <a:rPr lang="en-US" altLang="ko-KR" dirty="0" smtClean="0">
-                <a:solidFill>
-                  <a:schemeClr val="tx1"/>
-                </a:solidFill>
-                <a:sym typeface="Helvetica"/>
-              </a:rPr>
-              <a:t>German Traffic Sign Recognition </a:t>
-            </a:r>
-            <a:r>
-              <a:rPr lang="en-US" altLang="ko-KR" dirty="0" smtClean="0">
-                <a:solidFill>
-                  <a:schemeClr val="tx1"/>
-                </a:solidFill>
-                <a:sym typeface="Helvetica"/>
-              </a:rPr>
-              <a:t>Benchmark</a:t>
-            </a:r>
-            <a:r>
-              <a:rPr lang="ko-KR" altLang="en-US" dirty="0" smtClean="0">
-                <a:solidFill>
-                  <a:schemeClr val="tx1"/>
-                </a:solidFill>
-                <a:sym typeface="Helvetica"/>
-              </a:rPr>
-              <a:t>에서 </a:t>
-            </a:r>
-            <a:r>
-              <a:rPr lang="ko-KR" altLang="en-US" dirty="0" smtClean="0">
-                <a:solidFill>
-                  <a:srgbClr val="0000FF"/>
-                </a:solidFill>
-                <a:sym typeface="Helvetica"/>
-              </a:rPr>
-              <a:t>속도 제한 </a:t>
-            </a:r>
-            <a:r>
-              <a:rPr lang="ko-KR" altLang="en-US" dirty="0" err="1" smtClean="0">
-                <a:solidFill>
-                  <a:srgbClr val="0000FF"/>
-                </a:solidFill>
-                <a:sym typeface="Helvetica"/>
-              </a:rPr>
-              <a:t>표지판</a:t>
-            </a:r>
-            <a:r>
-              <a:rPr lang="ko-KR" altLang="en-US" dirty="0" err="1" smtClean="0">
-                <a:solidFill>
-                  <a:schemeClr val="tx1"/>
-                </a:solidFill>
-                <a:sym typeface="Helvetica"/>
-              </a:rPr>
-              <a:t>만을</a:t>
-            </a:r>
-            <a:r>
-              <a:rPr lang="ko-KR" altLang="en-US" dirty="0" smtClean="0">
-                <a:solidFill>
-                  <a:schemeClr val="tx1"/>
-                </a:solidFill>
-                <a:sym typeface="Helvetica"/>
-              </a:rPr>
-              <a:t> 이용</a:t>
-            </a:r>
-            <a:endParaRPr lang="en-US" altLang="ko-KR" b="1" dirty="0" smtClean="0">
-              <a:solidFill>
-                <a:srgbClr val="0000FF"/>
-              </a:solidFill>
-              <a:sym typeface="Helvetica"/>
-            </a:endParaRPr>
-          </a:p>
-        </p:txBody>
-      </p:sp>
-      <p:sp>
-        <p:nvSpPr>
-          <p:cNvPr id="101" name="Slide Number"/>
-          <p:cNvSpPr txBox="1">
-            <a:spLocks noGrp="1"/>
-          </p:cNvSpPr>
-          <p:nvPr>
-            <p:ph type="sldNum" sz="quarter" idx="2"/>
-          </p:nvPr>
-        </p:nvSpPr>
-        <p:spPr>
-          <a:prstGeom prst="rect">
-            <a:avLst/>
-          </a:prstGeom>
-          <a:extLst>
-            <a:ext uri="{C572A759-6A51-4108-AA02-DFA0A04FC94B}">
-              <ma14:wrappingTextBoxFlag xmlns="" xmlns:m="http://schemas.openxmlformats.org/officeDocument/2006/math" xmlns:a14="http://schemas.microsoft.com/office/drawing/2010/main" xmlns:ma14="http://schemas.microsoft.com/office/mac/drawingml/2011/main" val="1"/>
-            </a:ext>
-          </a:extLst>
-        </p:spPr>
-        <p:txBody>
-          <a:bodyPr/>
-          <a:lstStyle/>
-          <a:p>
-            <a:fld id="{86CB4B4D-7CA3-9044-876B-883B54F8677D}" type="slidenum">
-              <a:t>5</a:t>
             </a:fld>
             <a:endParaRPr/>
           </a:p>
@@ -5245,7 +4993,7 @@
 </p:sld>
 </file>
 
-<file path=ppt/slides/slide6.xml><?xml version="1.0" encoding="utf-8"?>
+<file path=ppt/slides/slide5.xml><?xml version="1.0" encoding="utf-8"?>
 <p:sld xmlns:a="http://schemas.openxmlformats.org/drawingml/2006/main" xmlns:r="http://schemas.openxmlformats.org/officeDocument/2006/relationships" xmlns:p="http://schemas.openxmlformats.org/presentationml/2006/main">
   <p:cSld>
     <p:spTree>
@@ -5351,25 +5099,7 @@
                 </a:solidFill>
                 <a:sym typeface="Helvetica"/>
               </a:rPr>
-              <a:t>German </a:t>
-            </a:r>
-            <a:r>
-              <a:rPr lang="en-US" altLang="ko-KR" dirty="0" smtClean="0">
-                <a:solidFill>
-                  <a:schemeClr val="tx1"/>
-                </a:solidFill>
-                <a:sym typeface="Helvetica"/>
-              </a:rPr>
-              <a:t>Traffic Sign Recognition </a:t>
-            </a:r>
-            <a:r>
-              <a:rPr lang="en-US" altLang="ko-KR" dirty="0" smtClean="0">
-                <a:solidFill>
-                  <a:schemeClr val="tx1"/>
-                </a:solidFill>
-                <a:sym typeface="Helvetica"/>
-              </a:rPr>
-              <a:t>Benchmark</a:t>
+              <a:t>German Traffic Sign Recognition Benchmark</a:t>
             </a:r>
             <a:r>
               <a:rPr lang="ko-KR" altLang="en-US" dirty="0" smtClean="0">
@@ -5617,7 +5347,7 @@
           <a:lstStyle/>
           <a:p>
             <a:fld id="{86CB4B4D-7CA3-9044-876B-883B54F8677D}" type="slidenum">
-              <a:t>6</a:t>
+              <a:t>5</a:t>
             </a:fld>
             <a:endParaRPr/>
           </a:p>
@@ -6424,7 +6154,7 @@
 </p:sld>
 </file>
 
-<file path=ppt/slides/slide7.xml><?xml version="1.0" encoding="utf-8"?>
+<file path=ppt/slides/slide6.xml><?xml version="1.0" encoding="utf-8"?>
 <p:sld xmlns:a="http://schemas.openxmlformats.org/drawingml/2006/main" xmlns:r="http://schemas.openxmlformats.org/officeDocument/2006/relationships" xmlns:p="http://schemas.openxmlformats.org/presentationml/2006/main">
   <p:cSld>
     <p:spTree>
@@ -6690,7 +6420,7 @@
           <a:lstStyle/>
           <a:p>
             <a:fld id="{86CB4B4D-7CA3-9044-876B-883B54F8677D}" type="slidenum">
-              <a:t>7</a:t>
+              <a:t>6</a:t>
             </a:fld>
             <a:endParaRPr/>
           </a:p>
@@ -6741,7 +6471,7 @@
 </p:sld>
 </file>
 
-<file path=ppt/slides/slide8.xml><?xml version="1.0" encoding="utf-8"?>
+<file path=ppt/slides/slide7.xml><?xml version="1.0" encoding="utf-8"?>
 <p:sld xmlns:a="http://schemas.openxmlformats.org/drawingml/2006/main" xmlns:r="http://schemas.openxmlformats.org/officeDocument/2006/relationships" xmlns:p="http://schemas.openxmlformats.org/presentationml/2006/main">
   <p:cSld>
     <p:spTree>
@@ -7136,7 +6866,7 @@
           <a:lstStyle/>
           <a:p>
             <a:fld id="{86CB4B4D-7CA3-9044-876B-883B54F8677D}" type="slidenum">
-              <a:t>8</a:t>
+              <a:t>7</a:t>
             </a:fld>
             <a:endParaRPr/>
           </a:p>
@@ -7163,7 +6893,7 @@
 </p:sld>
 </file>
 
-<file path=ppt/slides/slide9.xml><?xml version="1.0" encoding="utf-8"?>
+<file path=ppt/slides/slide8.xml><?xml version="1.0" encoding="utf-8"?>
 <p:sld xmlns:a="http://schemas.openxmlformats.org/drawingml/2006/main" xmlns:r="http://schemas.openxmlformats.org/officeDocument/2006/relationships" xmlns:p="http://schemas.openxmlformats.org/presentationml/2006/main">
   <p:cSld>
     <p:spTree>
@@ -7267,7 +6997,7 @@
           <a:lstStyle/>
           <a:p>
             <a:fld id="{86CB4B4D-7CA3-9044-876B-883B54F8677D}" type="slidenum">
-              <a:t>9</a:t>
+              <a:t>8</a:t>
             </a:fld>
             <a:endParaRPr/>
           </a:p>

</xml_diff>